<commit_message>
with/out parasitic  models are compared
Observe that parasitic model amplifies the some side band harmonics, (I think that it occurs because 3 phase balance system is effected). The leg current and impedance model will be calculated for the frequencies and we can explain the amplification with impedance model
</commit_message>
<xml_diff>
--- a/Reports/Weekly/11.05.2020.pptx
+++ b/Reports/Weekly/11.05.2020.pptx
@@ -260,7 +260,7 @@
           <a:p>
             <a:fld id="{FF04F230-6930-4A38-AB00-EEBA4139765D}" type="datetimeFigureOut">
               <a:rPr lang="en-US" smtClean="0"/>
-              <a:t>5/16/2020</a:t>
+              <a:t>5/18/2020</a:t>
             </a:fld>
             <a:endParaRPr lang="en-US"/>
           </a:p>
@@ -458,7 +458,7 @@
           <a:p>
             <a:fld id="{FF04F230-6930-4A38-AB00-EEBA4139765D}" type="datetimeFigureOut">
               <a:rPr lang="en-US" smtClean="0"/>
-              <a:t>5/16/2020</a:t>
+              <a:t>5/18/2020</a:t>
             </a:fld>
             <a:endParaRPr lang="en-US"/>
           </a:p>
@@ -666,7 +666,7 @@
           <a:p>
             <a:fld id="{FF04F230-6930-4A38-AB00-EEBA4139765D}" type="datetimeFigureOut">
               <a:rPr lang="en-US" smtClean="0"/>
-              <a:t>5/16/2020</a:t>
+              <a:t>5/18/2020</a:t>
             </a:fld>
             <a:endParaRPr lang="en-US"/>
           </a:p>
@@ -864,7 +864,7 @@
           <a:p>
             <a:fld id="{FF04F230-6930-4A38-AB00-EEBA4139765D}" type="datetimeFigureOut">
               <a:rPr lang="en-US" smtClean="0"/>
-              <a:t>5/16/2020</a:t>
+              <a:t>5/18/2020</a:t>
             </a:fld>
             <a:endParaRPr lang="en-US"/>
           </a:p>
@@ -1139,7 +1139,7 @@
           <a:p>
             <a:fld id="{FF04F230-6930-4A38-AB00-EEBA4139765D}" type="datetimeFigureOut">
               <a:rPr lang="en-US" smtClean="0"/>
-              <a:t>5/16/2020</a:t>
+              <a:t>5/18/2020</a:t>
             </a:fld>
             <a:endParaRPr lang="en-US"/>
           </a:p>
@@ -1404,7 +1404,7 @@
           <a:p>
             <a:fld id="{FF04F230-6930-4A38-AB00-EEBA4139765D}" type="datetimeFigureOut">
               <a:rPr lang="en-US" smtClean="0"/>
-              <a:t>5/16/2020</a:t>
+              <a:t>5/18/2020</a:t>
             </a:fld>
             <a:endParaRPr lang="en-US"/>
           </a:p>
@@ -1816,7 +1816,7 @@
           <a:p>
             <a:fld id="{FF04F230-6930-4A38-AB00-EEBA4139765D}" type="datetimeFigureOut">
               <a:rPr lang="en-US" smtClean="0"/>
-              <a:t>5/16/2020</a:t>
+              <a:t>5/18/2020</a:t>
             </a:fld>
             <a:endParaRPr lang="en-US"/>
           </a:p>
@@ -1957,7 +1957,7 @@
           <a:p>
             <a:fld id="{FF04F230-6930-4A38-AB00-EEBA4139765D}" type="datetimeFigureOut">
               <a:rPr lang="en-US" smtClean="0"/>
-              <a:t>5/16/2020</a:t>
+              <a:t>5/18/2020</a:t>
             </a:fld>
             <a:endParaRPr lang="en-US"/>
           </a:p>
@@ -2070,7 +2070,7 @@
           <a:p>
             <a:fld id="{FF04F230-6930-4A38-AB00-EEBA4139765D}" type="datetimeFigureOut">
               <a:rPr lang="en-US" smtClean="0"/>
-              <a:t>5/16/2020</a:t>
+              <a:t>5/18/2020</a:t>
             </a:fld>
             <a:endParaRPr lang="en-US"/>
           </a:p>
@@ -2381,7 +2381,7 @@
           <a:p>
             <a:fld id="{FF04F230-6930-4A38-AB00-EEBA4139765D}" type="datetimeFigureOut">
               <a:rPr lang="en-US" smtClean="0"/>
-              <a:t>5/16/2020</a:t>
+              <a:t>5/18/2020</a:t>
             </a:fld>
             <a:endParaRPr lang="en-US"/>
           </a:p>
@@ -2669,7 +2669,7 @@
           <a:p>
             <a:fld id="{FF04F230-6930-4A38-AB00-EEBA4139765D}" type="datetimeFigureOut">
               <a:rPr lang="en-US" smtClean="0"/>
-              <a:t>5/16/2020</a:t>
+              <a:t>5/18/2020</a:t>
             </a:fld>
             <a:endParaRPr lang="en-US"/>
           </a:p>
@@ -2910,7 +2910,7 @@
           <a:p>
             <a:fld id="{FF04F230-6930-4A38-AB00-EEBA4139765D}" type="datetimeFigureOut">
               <a:rPr lang="en-US" smtClean="0"/>
-              <a:t>5/16/2020</a:t>
+              <a:t>5/18/2020</a:t>
             </a:fld>
             <a:endParaRPr lang="en-US"/>
           </a:p>
@@ -3369,8 +3369,8 @@
           </a:p>
         </p:txBody>
       </p:sp>
-      <mc:AlternateContent xmlns:mc="http://schemas.openxmlformats.org/markup-compatibility/2006">
-        <mc:Choice xmlns:a14="http://schemas.microsoft.com/office/drawing/2010/main" Requires="a14">
+      <mc:AlternateContent xmlns:mc="http://schemas.openxmlformats.org/markup-compatibility/2006" xmlns:a14="http://schemas.microsoft.com/office/drawing/2010/main">
+        <mc:Choice Requires="a14">
           <p:sp>
             <p:nvSpPr>
               <p:cNvPr id="2" name="TextBox 1">
@@ -4060,7 +4060,7 @@
             </p:txBody>
           </p:sp>
         </mc:Choice>
-        <mc:Fallback>
+        <mc:Fallback xmlns="">
           <p:sp>
             <p:nvSpPr>
               <p:cNvPr id="2" name="TextBox 1">

</xml_diff>